<commit_message>
Address bugs with modified shadows
</commit_message>
<xml_diff>
--- a/doc/test/SyncLab/SyncLab_ShadowEffect.pptx
+++ b/doc/test/SyncLab/SyncLab_ShadowEffect.pptx
@@ -7,6 +7,7 @@
   <p:sldIdLst>
     <p:sldId id="256" r:id="rId2"/>
     <p:sldId id="257" r:id="rId3"/>
+    <p:sldId id="258" r:id="rId4"/>
   </p:sldIdLst>
   <p:sldSz cx="12192000" cy="6858000"/>
   <p:notesSz cx="6858000" cy="9144000"/>
@@ -139,7 +140,7 @@
           <p:cNvPr id="2" name="Title 1">
             <a:extLst>
               <a:ext uri="{FF2B5EF4-FFF2-40B4-BE49-F238E27FC236}">
-                <a16:creationId xmlns:a16="http://schemas.microsoft.com/office/drawing/2014/main" xmlns="" id="{F06534A7-64E8-4A2A-8E79-F4E6C3C91395}"/>
+                <a16:creationId xmlns="" xmlns:a16="http://schemas.microsoft.com/office/drawing/2014/main" id="{F06534A7-64E8-4A2A-8E79-F4E6C3C91395}"/>
               </a:ext>
             </a:extLst>
           </p:cNvPr>
@@ -176,7 +177,7 @@
           <p:cNvPr id="3" name="Subtitle 2">
             <a:extLst>
               <a:ext uri="{FF2B5EF4-FFF2-40B4-BE49-F238E27FC236}">
-                <a16:creationId xmlns:a16="http://schemas.microsoft.com/office/drawing/2014/main" xmlns="" id="{D4E74FEA-97B1-44E1-8DD4-668BAD9A522B}"/>
+                <a16:creationId xmlns="" xmlns:a16="http://schemas.microsoft.com/office/drawing/2014/main" id="{D4E74FEA-97B1-44E1-8DD4-668BAD9A522B}"/>
               </a:ext>
             </a:extLst>
           </p:cNvPr>
@@ -246,7 +247,7 @@
           <p:cNvPr id="4" name="Date Placeholder 3">
             <a:extLst>
               <a:ext uri="{FF2B5EF4-FFF2-40B4-BE49-F238E27FC236}">
-                <a16:creationId xmlns:a16="http://schemas.microsoft.com/office/drawing/2014/main" xmlns="" id="{3094C1BE-2575-491D-8593-0652C1C77D80}"/>
+                <a16:creationId xmlns="" xmlns:a16="http://schemas.microsoft.com/office/drawing/2014/main" id="{3094C1BE-2575-491D-8593-0652C1C77D80}"/>
               </a:ext>
             </a:extLst>
           </p:cNvPr>
@@ -264,7 +265,7 @@
           <a:p>
             <a:fld id="{99CDF236-79CD-4CF5-9FC4-E5D9CB69F2A4}" type="datetimeFigureOut">
               <a:rPr lang="en-US" smtClean="0"/>
-              <a:t>4/1/2018</a:t>
+              <a:t>4/10/2018</a:t>
             </a:fld>
             <a:endParaRPr lang="en-US"/>
           </a:p>
@@ -275,7 +276,7 @@
           <p:cNvPr id="5" name="Footer Placeholder 4">
             <a:extLst>
               <a:ext uri="{FF2B5EF4-FFF2-40B4-BE49-F238E27FC236}">
-                <a16:creationId xmlns:a16="http://schemas.microsoft.com/office/drawing/2014/main" xmlns="" id="{B02E6395-4BCA-4935-B52E-3AD088D7B553}"/>
+                <a16:creationId xmlns="" xmlns:a16="http://schemas.microsoft.com/office/drawing/2014/main" id="{B02E6395-4BCA-4935-B52E-3AD088D7B553}"/>
               </a:ext>
             </a:extLst>
           </p:cNvPr>
@@ -300,7 +301,7 @@
           <p:cNvPr id="6" name="Slide Number Placeholder 5">
             <a:extLst>
               <a:ext uri="{FF2B5EF4-FFF2-40B4-BE49-F238E27FC236}">
-                <a16:creationId xmlns:a16="http://schemas.microsoft.com/office/drawing/2014/main" xmlns="" id="{42C4A9ED-80DB-48DF-9992-E7BBADB0E51C}"/>
+                <a16:creationId xmlns="" xmlns:a16="http://schemas.microsoft.com/office/drawing/2014/main" id="{42C4A9ED-80DB-48DF-9992-E7BBADB0E51C}"/>
               </a:ext>
             </a:extLst>
           </p:cNvPr>
@@ -359,7 +360,7 @@
           <p:cNvPr id="2" name="Title 1">
             <a:extLst>
               <a:ext uri="{FF2B5EF4-FFF2-40B4-BE49-F238E27FC236}">
-                <a16:creationId xmlns:a16="http://schemas.microsoft.com/office/drawing/2014/main" xmlns="" id="{4380286F-C395-429B-B956-7E1958A72D2A}"/>
+                <a16:creationId xmlns="" xmlns:a16="http://schemas.microsoft.com/office/drawing/2014/main" id="{4380286F-C395-429B-B956-7E1958A72D2A}"/>
               </a:ext>
             </a:extLst>
           </p:cNvPr>
@@ -387,7 +388,7 @@
           <p:cNvPr id="3" name="Vertical Text Placeholder 2">
             <a:extLst>
               <a:ext uri="{FF2B5EF4-FFF2-40B4-BE49-F238E27FC236}">
-                <a16:creationId xmlns:a16="http://schemas.microsoft.com/office/drawing/2014/main" xmlns="" id="{F44E2AE9-58D1-4D34-A45A-7A2AECDA0885}"/>
+                <a16:creationId xmlns="" xmlns:a16="http://schemas.microsoft.com/office/drawing/2014/main" id="{F44E2AE9-58D1-4D34-A45A-7A2AECDA0885}"/>
               </a:ext>
             </a:extLst>
           </p:cNvPr>
@@ -444,7 +445,7 @@
           <p:cNvPr id="4" name="Date Placeholder 3">
             <a:extLst>
               <a:ext uri="{FF2B5EF4-FFF2-40B4-BE49-F238E27FC236}">
-                <a16:creationId xmlns:a16="http://schemas.microsoft.com/office/drawing/2014/main" xmlns="" id="{B95DFCDF-C20C-4075-A4E4-28783D6A8C30}"/>
+                <a16:creationId xmlns="" xmlns:a16="http://schemas.microsoft.com/office/drawing/2014/main" id="{B95DFCDF-C20C-4075-A4E4-28783D6A8C30}"/>
               </a:ext>
             </a:extLst>
           </p:cNvPr>
@@ -462,7 +463,7 @@
           <a:p>
             <a:fld id="{99CDF236-79CD-4CF5-9FC4-E5D9CB69F2A4}" type="datetimeFigureOut">
               <a:rPr lang="en-US" smtClean="0"/>
-              <a:t>4/1/2018</a:t>
+              <a:t>4/10/2018</a:t>
             </a:fld>
             <a:endParaRPr lang="en-US"/>
           </a:p>
@@ -473,7 +474,7 @@
           <p:cNvPr id="5" name="Footer Placeholder 4">
             <a:extLst>
               <a:ext uri="{FF2B5EF4-FFF2-40B4-BE49-F238E27FC236}">
-                <a16:creationId xmlns:a16="http://schemas.microsoft.com/office/drawing/2014/main" xmlns="" id="{4291234F-26AE-4A2E-A8D7-E4D49A95E672}"/>
+                <a16:creationId xmlns="" xmlns:a16="http://schemas.microsoft.com/office/drawing/2014/main" id="{4291234F-26AE-4A2E-A8D7-E4D49A95E672}"/>
               </a:ext>
             </a:extLst>
           </p:cNvPr>
@@ -498,7 +499,7 @@
           <p:cNvPr id="6" name="Slide Number Placeholder 5">
             <a:extLst>
               <a:ext uri="{FF2B5EF4-FFF2-40B4-BE49-F238E27FC236}">
-                <a16:creationId xmlns:a16="http://schemas.microsoft.com/office/drawing/2014/main" xmlns="" id="{B5BF1F1B-790E-4071-BA53-AA0C48E0AFEC}"/>
+                <a16:creationId xmlns="" xmlns:a16="http://schemas.microsoft.com/office/drawing/2014/main" id="{B5BF1F1B-790E-4071-BA53-AA0C48E0AFEC}"/>
               </a:ext>
             </a:extLst>
           </p:cNvPr>
@@ -557,7 +558,7 @@
           <p:cNvPr id="2" name="Vertical Title 1">
             <a:extLst>
               <a:ext uri="{FF2B5EF4-FFF2-40B4-BE49-F238E27FC236}">
-                <a16:creationId xmlns:a16="http://schemas.microsoft.com/office/drawing/2014/main" xmlns="" id="{6AF5DFA2-226E-46F1-AFC0-DBB19FBABEA5}"/>
+                <a16:creationId xmlns="" xmlns:a16="http://schemas.microsoft.com/office/drawing/2014/main" id="{6AF5DFA2-226E-46F1-AFC0-DBB19FBABEA5}"/>
               </a:ext>
             </a:extLst>
           </p:cNvPr>
@@ -590,7 +591,7 @@
           <p:cNvPr id="3" name="Vertical Text Placeholder 2">
             <a:extLst>
               <a:ext uri="{FF2B5EF4-FFF2-40B4-BE49-F238E27FC236}">
-                <a16:creationId xmlns:a16="http://schemas.microsoft.com/office/drawing/2014/main" xmlns="" id="{D7317E96-570A-42DF-901E-C53746C91B40}"/>
+                <a16:creationId xmlns="" xmlns:a16="http://schemas.microsoft.com/office/drawing/2014/main" id="{D7317E96-570A-42DF-901E-C53746C91B40}"/>
               </a:ext>
             </a:extLst>
           </p:cNvPr>
@@ -652,7 +653,7 @@
           <p:cNvPr id="4" name="Date Placeholder 3">
             <a:extLst>
               <a:ext uri="{FF2B5EF4-FFF2-40B4-BE49-F238E27FC236}">
-                <a16:creationId xmlns:a16="http://schemas.microsoft.com/office/drawing/2014/main" xmlns="" id="{92A33256-5264-4EDD-80A9-D6E6EC671DEB}"/>
+                <a16:creationId xmlns="" xmlns:a16="http://schemas.microsoft.com/office/drawing/2014/main" id="{92A33256-5264-4EDD-80A9-D6E6EC671DEB}"/>
               </a:ext>
             </a:extLst>
           </p:cNvPr>
@@ -670,7 +671,7 @@
           <a:p>
             <a:fld id="{99CDF236-79CD-4CF5-9FC4-E5D9CB69F2A4}" type="datetimeFigureOut">
               <a:rPr lang="en-US" smtClean="0"/>
-              <a:t>4/1/2018</a:t>
+              <a:t>4/10/2018</a:t>
             </a:fld>
             <a:endParaRPr lang="en-US"/>
           </a:p>
@@ -681,7 +682,7 @@
           <p:cNvPr id="5" name="Footer Placeholder 4">
             <a:extLst>
               <a:ext uri="{FF2B5EF4-FFF2-40B4-BE49-F238E27FC236}">
-                <a16:creationId xmlns:a16="http://schemas.microsoft.com/office/drawing/2014/main" xmlns="" id="{586B278F-DE2E-4595-B881-355A53C74F36}"/>
+                <a16:creationId xmlns="" xmlns:a16="http://schemas.microsoft.com/office/drawing/2014/main" id="{586B278F-DE2E-4595-B881-355A53C74F36}"/>
               </a:ext>
             </a:extLst>
           </p:cNvPr>
@@ -706,7 +707,7 @@
           <p:cNvPr id="6" name="Slide Number Placeholder 5">
             <a:extLst>
               <a:ext uri="{FF2B5EF4-FFF2-40B4-BE49-F238E27FC236}">
-                <a16:creationId xmlns:a16="http://schemas.microsoft.com/office/drawing/2014/main" xmlns="" id="{2EBA7512-F909-465D-B3FF-261FE1BCE001}"/>
+                <a16:creationId xmlns="" xmlns:a16="http://schemas.microsoft.com/office/drawing/2014/main" id="{2EBA7512-F909-465D-B3FF-261FE1BCE001}"/>
               </a:ext>
             </a:extLst>
           </p:cNvPr>
@@ -765,7 +766,7 @@
           <p:cNvPr id="2" name="Title 1">
             <a:extLst>
               <a:ext uri="{FF2B5EF4-FFF2-40B4-BE49-F238E27FC236}">
-                <a16:creationId xmlns:a16="http://schemas.microsoft.com/office/drawing/2014/main" xmlns="" id="{1D1FBA20-C721-45D9-968A-A68CB3B387F0}"/>
+                <a16:creationId xmlns="" xmlns:a16="http://schemas.microsoft.com/office/drawing/2014/main" id="{1D1FBA20-C721-45D9-968A-A68CB3B387F0}"/>
               </a:ext>
             </a:extLst>
           </p:cNvPr>
@@ -793,7 +794,7 @@
           <p:cNvPr id="3" name="Content Placeholder 2">
             <a:extLst>
               <a:ext uri="{FF2B5EF4-FFF2-40B4-BE49-F238E27FC236}">
-                <a16:creationId xmlns:a16="http://schemas.microsoft.com/office/drawing/2014/main" xmlns="" id="{D4D8C969-281B-41C0-94D3-414676219E10}"/>
+                <a16:creationId xmlns="" xmlns:a16="http://schemas.microsoft.com/office/drawing/2014/main" id="{D4D8C969-281B-41C0-94D3-414676219E10}"/>
               </a:ext>
             </a:extLst>
           </p:cNvPr>
@@ -850,7 +851,7 @@
           <p:cNvPr id="4" name="Date Placeholder 3">
             <a:extLst>
               <a:ext uri="{FF2B5EF4-FFF2-40B4-BE49-F238E27FC236}">
-                <a16:creationId xmlns:a16="http://schemas.microsoft.com/office/drawing/2014/main" xmlns="" id="{E2A127D6-D5D2-4E50-A9FC-ADFAC3C66813}"/>
+                <a16:creationId xmlns="" xmlns:a16="http://schemas.microsoft.com/office/drawing/2014/main" id="{E2A127D6-D5D2-4E50-A9FC-ADFAC3C66813}"/>
               </a:ext>
             </a:extLst>
           </p:cNvPr>
@@ -868,7 +869,7 @@
           <a:p>
             <a:fld id="{99CDF236-79CD-4CF5-9FC4-E5D9CB69F2A4}" type="datetimeFigureOut">
               <a:rPr lang="en-US" smtClean="0"/>
-              <a:t>4/1/2018</a:t>
+              <a:t>4/10/2018</a:t>
             </a:fld>
             <a:endParaRPr lang="en-US"/>
           </a:p>
@@ -879,7 +880,7 @@
           <p:cNvPr id="5" name="Footer Placeholder 4">
             <a:extLst>
               <a:ext uri="{FF2B5EF4-FFF2-40B4-BE49-F238E27FC236}">
-                <a16:creationId xmlns:a16="http://schemas.microsoft.com/office/drawing/2014/main" xmlns="" id="{829DCC74-2674-4127-ABA2-B88C68611492}"/>
+                <a16:creationId xmlns="" xmlns:a16="http://schemas.microsoft.com/office/drawing/2014/main" id="{829DCC74-2674-4127-ABA2-B88C68611492}"/>
               </a:ext>
             </a:extLst>
           </p:cNvPr>
@@ -904,7 +905,7 @@
           <p:cNvPr id="6" name="Slide Number Placeholder 5">
             <a:extLst>
               <a:ext uri="{FF2B5EF4-FFF2-40B4-BE49-F238E27FC236}">
-                <a16:creationId xmlns:a16="http://schemas.microsoft.com/office/drawing/2014/main" xmlns="" id="{50DA4C3C-3BB8-434D-91AA-B9858AAF4B0E}"/>
+                <a16:creationId xmlns="" xmlns:a16="http://schemas.microsoft.com/office/drawing/2014/main" id="{50DA4C3C-3BB8-434D-91AA-B9858AAF4B0E}"/>
               </a:ext>
             </a:extLst>
           </p:cNvPr>
@@ -963,7 +964,7 @@
           <p:cNvPr id="2" name="Title 1">
             <a:extLst>
               <a:ext uri="{FF2B5EF4-FFF2-40B4-BE49-F238E27FC236}">
-                <a16:creationId xmlns:a16="http://schemas.microsoft.com/office/drawing/2014/main" xmlns="" id="{74B375FF-1676-491F-862D-3DF44B3295C7}"/>
+                <a16:creationId xmlns="" xmlns:a16="http://schemas.microsoft.com/office/drawing/2014/main" id="{74B375FF-1676-491F-862D-3DF44B3295C7}"/>
               </a:ext>
             </a:extLst>
           </p:cNvPr>
@@ -1000,7 +1001,7 @@
           <p:cNvPr id="3" name="Text Placeholder 2">
             <a:extLst>
               <a:ext uri="{FF2B5EF4-FFF2-40B4-BE49-F238E27FC236}">
-                <a16:creationId xmlns:a16="http://schemas.microsoft.com/office/drawing/2014/main" xmlns="" id="{51BAC31C-5829-4E75-A9A8-5D3505A8DA9C}"/>
+                <a16:creationId xmlns="" xmlns:a16="http://schemas.microsoft.com/office/drawing/2014/main" id="{51BAC31C-5829-4E75-A9A8-5D3505A8DA9C}"/>
               </a:ext>
             </a:extLst>
           </p:cNvPr>
@@ -1125,7 +1126,7 @@
           <p:cNvPr id="4" name="Date Placeholder 3">
             <a:extLst>
               <a:ext uri="{FF2B5EF4-FFF2-40B4-BE49-F238E27FC236}">
-                <a16:creationId xmlns:a16="http://schemas.microsoft.com/office/drawing/2014/main" xmlns="" id="{0D83A215-C8BF-4AAE-9B27-C5362C5D5F5E}"/>
+                <a16:creationId xmlns="" xmlns:a16="http://schemas.microsoft.com/office/drawing/2014/main" id="{0D83A215-C8BF-4AAE-9B27-C5362C5D5F5E}"/>
               </a:ext>
             </a:extLst>
           </p:cNvPr>
@@ -1143,7 +1144,7 @@
           <a:p>
             <a:fld id="{99CDF236-79CD-4CF5-9FC4-E5D9CB69F2A4}" type="datetimeFigureOut">
               <a:rPr lang="en-US" smtClean="0"/>
-              <a:t>4/1/2018</a:t>
+              <a:t>4/10/2018</a:t>
             </a:fld>
             <a:endParaRPr lang="en-US"/>
           </a:p>
@@ -1154,7 +1155,7 @@
           <p:cNvPr id="5" name="Footer Placeholder 4">
             <a:extLst>
               <a:ext uri="{FF2B5EF4-FFF2-40B4-BE49-F238E27FC236}">
-                <a16:creationId xmlns:a16="http://schemas.microsoft.com/office/drawing/2014/main" xmlns="" id="{95B0D524-0312-499D-9931-D224757D37F9}"/>
+                <a16:creationId xmlns="" xmlns:a16="http://schemas.microsoft.com/office/drawing/2014/main" id="{95B0D524-0312-499D-9931-D224757D37F9}"/>
               </a:ext>
             </a:extLst>
           </p:cNvPr>
@@ -1179,7 +1180,7 @@
           <p:cNvPr id="6" name="Slide Number Placeholder 5">
             <a:extLst>
               <a:ext uri="{FF2B5EF4-FFF2-40B4-BE49-F238E27FC236}">
-                <a16:creationId xmlns:a16="http://schemas.microsoft.com/office/drawing/2014/main" xmlns="" id="{CBE89599-260B-49AD-BD1C-DEBB5F904A31}"/>
+                <a16:creationId xmlns="" xmlns:a16="http://schemas.microsoft.com/office/drawing/2014/main" id="{CBE89599-260B-49AD-BD1C-DEBB5F904A31}"/>
               </a:ext>
             </a:extLst>
           </p:cNvPr>
@@ -1238,7 +1239,7 @@
           <p:cNvPr id="2" name="Title 1">
             <a:extLst>
               <a:ext uri="{FF2B5EF4-FFF2-40B4-BE49-F238E27FC236}">
-                <a16:creationId xmlns:a16="http://schemas.microsoft.com/office/drawing/2014/main" xmlns="" id="{6825A865-B0CC-4967-81C1-DFD30DCB76C6}"/>
+                <a16:creationId xmlns="" xmlns:a16="http://schemas.microsoft.com/office/drawing/2014/main" id="{6825A865-B0CC-4967-81C1-DFD30DCB76C6}"/>
               </a:ext>
             </a:extLst>
           </p:cNvPr>
@@ -1266,7 +1267,7 @@
           <p:cNvPr id="3" name="Content Placeholder 2">
             <a:extLst>
               <a:ext uri="{FF2B5EF4-FFF2-40B4-BE49-F238E27FC236}">
-                <a16:creationId xmlns:a16="http://schemas.microsoft.com/office/drawing/2014/main" xmlns="" id="{AC29DFE1-1FE9-46F8-A642-AA83C06B5BE0}"/>
+                <a16:creationId xmlns="" xmlns:a16="http://schemas.microsoft.com/office/drawing/2014/main" id="{AC29DFE1-1FE9-46F8-A642-AA83C06B5BE0}"/>
               </a:ext>
             </a:extLst>
           </p:cNvPr>
@@ -1328,7 +1329,7 @@
           <p:cNvPr id="4" name="Content Placeholder 3">
             <a:extLst>
               <a:ext uri="{FF2B5EF4-FFF2-40B4-BE49-F238E27FC236}">
-                <a16:creationId xmlns:a16="http://schemas.microsoft.com/office/drawing/2014/main" xmlns="" id="{9450E7AF-8F2C-4AB6-BAF0-0FB914B86E30}"/>
+                <a16:creationId xmlns="" xmlns:a16="http://schemas.microsoft.com/office/drawing/2014/main" id="{9450E7AF-8F2C-4AB6-BAF0-0FB914B86E30}"/>
               </a:ext>
             </a:extLst>
           </p:cNvPr>
@@ -1390,7 +1391,7 @@
           <p:cNvPr id="5" name="Date Placeholder 4">
             <a:extLst>
               <a:ext uri="{FF2B5EF4-FFF2-40B4-BE49-F238E27FC236}">
-                <a16:creationId xmlns:a16="http://schemas.microsoft.com/office/drawing/2014/main" xmlns="" id="{05012D7D-21F4-4E00-9BE4-4F603794788A}"/>
+                <a16:creationId xmlns="" xmlns:a16="http://schemas.microsoft.com/office/drawing/2014/main" id="{05012D7D-21F4-4E00-9BE4-4F603794788A}"/>
               </a:ext>
             </a:extLst>
           </p:cNvPr>
@@ -1408,7 +1409,7 @@
           <a:p>
             <a:fld id="{99CDF236-79CD-4CF5-9FC4-E5D9CB69F2A4}" type="datetimeFigureOut">
               <a:rPr lang="en-US" smtClean="0"/>
-              <a:t>4/1/2018</a:t>
+              <a:t>4/10/2018</a:t>
             </a:fld>
             <a:endParaRPr lang="en-US"/>
           </a:p>
@@ -1419,7 +1420,7 @@
           <p:cNvPr id="6" name="Footer Placeholder 5">
             <a:extLst>
               <a:ext uri="{FF2B5EF4-FFF2-40B4-BE49-F238E27FC236}">
-                <a16:creationId xmlns:a16="http://schemas.microsoft.com/office/drawing/2014/main" xmlns="" id="{B56AD87E-83F2-44C9-9D33-0FF4730913ED}"/>
+                <a16:creationId xmlns="" xmlns:a16="http://schemas.microsoft.com/office/drawing/2014/main" id="{B56AD87E-83F2-44C9-9D33-0FF4730913ED}"/>
               </a:ext>
             </a:extLst>
           </p:cNvPr>
@@ -1444,7 +1445,7 @@
           <p:cNvPr id="7" name="Slide Number Placeholder 6">
             <a:extLst>
               <a:ext uri="{FF2B5EF4-FFF2-40B4-BE49-F238E27FC236}">
-                <a16:creationId xmlns:a16="http://schemas.microsoft.com/office/drawing/2014/main" xmlns="" id="{64769769-52FD-43F8-BC73-C113141FAB94}"/>
+                <a16:creationId xmlns="" xmlns:a16="http://schemas.microsoft.com/office/drawing/2014/main" id="{64769769-52FD-43F8-BC73-C113141FAB94}"/>
               </a:ext>
             </a:extLst>
           </p:cNvPr>
@@ -1503,7 +1504,7 @@
           <p:cNvPr id="2" name="Title 1">
             <a:extLst>
               <a:ext uri="{FF2B5EF4-FFF2-40B4-BE49-F238E27FC236}">
-                <a16:creationId xmlns:a16="http://schemas.microsoft.com/office/drawing/2014/main" xmlns="" id="{5783B1C2-6433-4982-BE82-8E226A39184C}"/>
+                <a16:creationId xmlns="" xmlns:a16="http://schemas.microsoft.com/office/drawing/2014/main" id="{5783B1C2-6433-4982-BE82-8E226A39184C}"/>
               </a:ext>
             </a:extLst>
           </p:cNvPr>
@@ -1536,7 +1537,7 @@
           <p:cNvPr id="3" name="Text Placeholder 2">
             <a:extLst>
               <a:ext uri="{FF2B5EF4-FFF2-40B4-BE49-F238E27FC236}">
-                <a16:creationId xmlns:a16="http://schemas.microsoft.com/office/drawing/2014/main" xmlns="" id="{1D5D6275-4BE0-4715-A920-56225A432BF9}"/>
+                <a16:creationId xmlns="" xmlns:a16="http://schemas.microsoft.com/office/drawing/2014/main" id="{1D5D6275-4BE0-4715-A920-56225A432BF9}"/>
               </a:ext>
             </a:extLst>
           </p:cNvPr>
@@ -1607,7 +1608,7 @@
           <p:cNvPr id="4" name="Content Placeholder 3">
             <a:extLst>
               <a:ext uri="{FF2B5EF4-FFF2-40B4-BE49-F238E27FC236}">
-                <a16:creationId xmlns:a16="http://schemas.microsoft.com/office/drawing/2014/main" xmlns="" id="{9BC07E0B-4E40-42F2-8072-41340F080D01}"/>
+                <a16:creationId xmlns="" xmlns:a16="http://schemas.microsoft.com/office/drawing/2014/main" id="{9BC07E0B-4E40-42F2-8072-41340F080D01}"/>
               </a:ext>
             </a:extLst>
           </p:cNvPr>
@@ -1669,7 +1670,7 @@
           <p:cNvPr id="5" name="Text Placeholder 4">
             <a:extLst>
               <a:ext uri="{FF2B5EF4-FFF2-40B4-BE49-F238E27FC236}">
-                <a16:creationId xmlns:a16="http://schemas.microsoft.com/office/drawing/2014/main" xmlns="" id="{ADAD8FB4-D2BD-46A1-BC45-D49F91953BD4}"/>
+                <a16:creationId xmlns="" xmlns:a16="http://schemas.microsoft.com/office/drawing/2014/main" id="{ADAD8FB4-D2BD-46A1-BC45-D49F91953BD4}"/>
               </a:ext>
             </a:extLst>
           </p:cNvPr>
@@ -1740,7 +1741,7 @@
           <p:cNvPr id="6" name="Content Placeholder 5">
             <a:extLst>
               <a:ext uri="{FF2B5EF4-FFF2-40B4-BE49-F238E27FC236}">
-                <a16:creationId xmlns:a16="http://schemas.microsoft.com/office/drawing/2014/main" xmlns="" id="{934127CF-6167-43C4-A612-9B22F479DCE0}"/>
+                <a16:creationId xmlns="" xmlns:a16="http://schemas.microsoft.com/office/drawing/2014/main" id="{934127CF-6167-43C4-A612-9B22F479DCE0}"/>
               </a:ext>
             </a:extLst>
           </p:cNvPr>
@@ -1802,7 +1803,7 @@
           <p:cNvPr id="7" name="Date Placeholder 6">
             <a:extLst>
               <a:ext uri="{FF2B5EF4-FFF2-40B4-BE49-F238E27FC236}">
-                <a16:creationId xmlns:a16="http://schemas.microsoft.com/office/drawing/2014/main" xmlns="" id="{292317B6-19D4-4151-9D62-A445F926593B}"/>
+                <a16:creationId xmlns="" xmlns:a16="http://schemas.microsoft.com/office/drawing/2014/main" id="{292317B6-19D4-4151-9D62-A445F926593B}"/>
               </a:ext>
             </a:extLst>
           </p:cNvPr>
@@ -1820,7 +1821,7 @@
           <a:p>
             <a:fld id="{99CDF236-79CD-4CF5-9FC4-E5D9CB69F2A4}" type="datetimeFigureOut">
               <a:rPr lang="en-US" smtClean="0"/>
-              <a:t>4/1/2018</a:t>
+              <a:t>4/10/2018</a:t>
             </a:fld>
             <a:endParaRPr lang="en-US"/>
           </a:p>
@@ -1831,7 +1832,7 @@
           <p:cNvPr id="8" name="Footer Placeholder 7">
             <a:extLst>
               <a:ext uri="{FF2B5EF4-FFF2-40B4-BE49-F238E27FC236}">
-                <a16:creationId xmlns:a16="http://schemas.microsoft.com/office/drawing/2014/main" xmlns="" id="{F971245D-AD2A-451A-9D61-70328D39D213}"/>
+                <a16:creationId xmlns="" xmlns:a16="http://schemas.microsoft.com/office/drawing/2014/main" id="{F971245D-AD2A-451A-9D61-70328D39D213}"/>
               </a:ext>
             </a:extLst>
           </p:cNvPr>
@@ -1856,7 +1857,7 @@
           <p:cNvPr id="9" name="Slide Number Placeholder 8">
             <a:extLst>
               <a:ext uri="{FF2B5EF4-FFF2-40B4-BE49-F238E27FC236}">
-                <a16:creationId xmlns:a16="http://schemas.microsoft.com/office/drawing/2014/main" xmlns="" id="{A39BB8DE-C4E6-4588-AAC5-A170E36E0CFF}"/>
+                <a16:creationId xmlns="" xmlns:a16="http://schemas.microsoft.com/office/drawing/2014/main" id="{A39BB8DE-C4E6-4588-AAC5-A170E36E0CFF}"/>
               </a:ext>
             </a:extLst>
           </p:cNvPr>
@@ -1915,7 +1916,7 @@
           <p:cNvPr id="2" name="Title 1">
             <a:extLst>
               <a:ext uri="{FF2B5EF4-FFF2-40B4-BE49-F238E27FC236}">
-                <a16:creationId xmlns:a16="http://schemas.microsoft.com/office/drawing/2014/main" xmlns="" id="{A1A53F46-FBE3-4B23-A560-7ECA82A0DE1F}"/>
+                <a16:creationId xmlns="" xmlns:a16="http://schemas.microsoft.com/office/drawing/2014/main" id="{A1A53F46-FBE3-4B23-A560-7ECA82A0DE1F}"/>
               </a:ext>
             </a:extLst>
           </p:cNvPr>
@@ -1943,7 +1944,7 @@
           <p:cNvPr id="3" name="Date Placeholder 2">
             <a:extLst>
               <a:ext uri="{FF2B5EF4-FFF2-40B4-BE49-F238E27FC236}">
-                <a16:creationId xmlns:a16="http://schemas.microsoft.com/office/drawing/2014/main" xmlns="" id="{875DFC59-2B1E-4B70-AF74-208D86CF2E9B}"/>
+                <a16:creationId xmlns="" xmlns:a16="http://schemas.microsoft.com/office/drawing/2014/main" id="{875DFC59-2B1E-4B70-AF74-208D86CF2E9B}"/>
               </a:ext>
             </a:extLst>
           </p:cNvPr>
@@ -1961,7 +1962,7 @@
           <a:p>
             <a:fld id="{99CDF236-79CD-4CF5-9FC4-E5D9CB69F2A4}" type="datetimeFigureOut">
               <a:rPr lang="en-US" smtClean="0"/>
-              <a:t>4/1/2018</a:t>
+              <a:t>4/10/2018</a:t>
             </a:fld>
             <a:endParaRPr lang="en-US"/>
           </a:p>
@@ -1972,7 +1973,7 @@
           <p:cNvPr id="4" name="Footer Placeholder 3">
             <a:extLst>
               <a:ext uri="{FF2B5EF4-FFF2-40B4-BE49-F238E27FC236}">
-                <a16:creationId xmlns:a16="http://schemas.microsoft.com/office/drawing/2014/main" xmlns="" id="{C3C1B257-DE09-4D46-A271-9116408299BC}"/>
+                <a16:creationId xmlns="" xmlns:a16="http://schemas.microsoft.com/office/drawing/2014/main" id="{C3C1B257-DE09-4D46-A271-9116408299BC}"/>
               </a:ext>
             </a:extLst>
           </p:cNvPr>
@@ -1997,7 +1998,7 @@
           <p:cNvPr id="5" name="Slide Number Placeholder 4">
             <a:extLst>
               <a:ext uri="{FF2B5EF4-FFF2-40B4-BE49-F238E27FC236}">
-                <a16:creationId xmlns:a16="http://schemas.microsoft.com/office/drawing/2014/main" xmlns="" id="{9FB066CB-0B85-4D3D-92AF-2C2ADC94CA96}"/>
+                <a16:creationId xmlns="" xmlns:a16="http://schemas.microsoft.com/office/drawing/2014/main" id="{9FB066CB-0B85-4D3D-92AF-2C2ADC94CA96}"/>
               </a:ext>
             </a:extLst>
           </p:cNvPr>
@@ -2056,7 +2057,7 @@
           <p:cNvPr id="2" name="Date Placeholder 1">
             <a:extLst>
               <a:ext uri="{FF2B5EF4-FFF2-40B4-BE49-F238E27FC236}">
-                <a16:creationId xmlns:a16="http://schemas.microsoft.com/office/drawing/2014/main" xmlns="" id="{211A600A-4AF8-4EA0-9D28-F8D640CCECE4}"/>
+                <a16:creationId xmlns="" xmlns:a16="http://schemas.microsoft.com/office/drawing/2014/main" id="{211A600A-4AF8-4EA0-9D28-F8D640CCECE4}"/>
               </a:ext>
             </a:extLst>
           </p:cNvPr>
@@ -2074,7 +2075,7 @@
           <a:p>
             <a:fld id="{99CDF236-79CD-4CF5-9FC4-E5D9CB69F2A4}" type="datetimeFigureOut">
               <a:rPr lang="en-US" smtClean="0"/>
-              <a:t>4/1/2018</a:t>
+              <a:t>4/10/2018</a:t>
             </a:fld>
             <a:endParaRPr lang="en-US"/>
           </a:p>
@@ -2085,7 +2086,7 @@
           <p:cNvPr id="3" name="Footer Placeholder 2">
             <a:extLst>
               <a:ext uri="{FF2B5EF4-FFF2-40B4-BE49-F238E27FC236}">
-                <a16:creationId xmlns:a16="http://schemas.microsoft.com/office/drawing/2014/main" xmlns="" id="{4A231600-C7A9-445C-8B55-D0217DE80284}"/>
+                <a16:creationId xmlns="" xmlns:a16="http://schemas.microsoft.com/office/drawing/2014/main" id="{4A231600-C7A9-445C-8B55-D0217DE80284}"/>
               </a:ext>
             </a:extLst>
           </p:cNvPr>
@@ -2110,7 +2111,7 @@
           <p:cNvPr id="4" name="Slide Number Placeholder 3">
             <a:extLst>
               <a:ext uri="{FF2B5EF4-FFF2-40B4-BE49-F238E27FC236}">
-                <a16:creationId xmlns:a16="http://schemas.microsoft.com/office/drawing/2014/main" xmlns="" id="{5935AF3E-F030-44BD-9457-41407F06D9E6}"/>
+                <a16:creationId xmlns="" xmlns:a16="http://schemas.microsoft.com/office/drawing/2014/main" id="{5935AF3E-F030-44BD-9457-41407F06D9E6}"/>
               </a:ext>
             </a:extLst>
           </p:cNvPr>
@@ -2169,7 +2170,7 @@
           <p:cNvPr id="2" name="Title 1">
             <a:extLst>
               <a:ext uri="{FF2B5EF4-FFF2-40B4-BE49-F238E27FC236}">
-                <a16:creationId xmlns:a16="http://schemas.microsoft.com/office/drawing/2014/main" xmlns="" id="{8363453A-4CE8-4209-AAE0-F1C6E53844C6}"/>
+                <a16:creationId xmlns="" xmlns:a16="http://schemas.microsoft.com/office/drawing/2014/main" id="{8363453A-4CE8-4209-AAE0-F1C6E53844C6}"/>
               </a:ext>
             </a:extLst>
           </p:cNvPr>
@@ -2206,7 +2207,7 @@
           <p:cNvPr id="3" name="Content Placeholder 2">
             <a:extLst>
               <a:ext uri="{FF2B5EF4-FFF2-40B4-BE49-F238E27FC236}">
-                <a16:creationId xmlns:a16="http://schemas.microsoft.com/office/drawing/2014/main" xmlns="" id="{9A875D76-8918-494C-9227-C64F1E925FF8}"/>
+                <a16:creationId xmlns="" xmlns:a16="http://schemas.microsoft.com/office/drawing/2014/main" id="{9A875D76-8918-494C-9227-C64F1E925FF8}"/>
               </a:ext>
             </a:extLst>
           </p:cNvPr>
@@ -2296,7 +2297,7 @@
           <p:cNvPr id="4" name="Text Placeholder 3">
             <a:extLst>
               <a:ext uri="{FF2B5EF4-FFF2-40B4-BE49-F238E27FC236}">
-                <a16:creationId xmlns:a16="http://schemas.microsoft.com/office/drawing/2014/main" xmlns="" id="{66373503-8748-467F-BF3D-3DFF012A3BC2}"/>
+                <a16:creationId xmlns="" xmlns:a16="http://schemas.microsoft.com/office/drawing/2014/main" id="{66373503-8748-467F-BF3D-3DFF012A3BC2}"/>
               </a:ext>
             </a:extLst>
           </p:cNvPr>
@@ -2367,7 +2368,7 @@
           <p:cNvPr id="5" name="Date Placeholder 4">
             <a:extLst>
               <a:ext uri="{FF2B5EF4-FFF2-40B4-BE49-F238E27FC236}">
-                <a16:creationId xmlns:a16="http://schemas.microsoft.com/office/drawing/2014/main" xmlns="" id="{1B9C4AF6-3BAF-43F2-9B0C-BABF2B71556F}"/>
+                <a16:creationId xmlns="" xmlns:a16="http://schemas.microsoft.com/office/drawing/2014/main" id="{1B9C4AF6-3BAF-43F2-9B0C-BABF2B71556F}"/>
               </a:ext>
             </a:extLst>
           </p:cNvPr>
@@ -2385,7 +2386,7 @@
           <a:p>
             <a:fld id="{99CDF236-79CD-4CF5-9FC4-E5D9CB69F2A4}" type="datetimeFigureOut">
               <a:rPr lang="en-US" smtClean="0"/>
-              <a:t>4/1/2018</a:t>
+              <a:t>4/10/2018</a:t>
             </a:fld>
             <a:endParaRPr lang="en-US"/>
           </a:p>
@@ -2396,7 +2397,7 @@
           <p:cNvPr id="6" name="Footer Placeholder 5">
             <a:extLst>
               <a:ext uri="{FF2B5EF4-FFF2-40B4-BE49-F238E27FC236}">
-                <a16:creationId xmlns:a16="http://schemas.microsoft.com/office/drawing/2014/main" xmlns="" id="{FDEBCF27-BC40-48CE-A7C4-3D48A594453A}"/>
+                <a16:creationId xmlns="" xmlns:a16="http://schemas.microsoft.com/office/drawing/2014/main" id="{FDEBCF27-BC40-48CE-A7C4-3D48A594453A}"/>
               </a:ext>
             </a:extLst>
           </p:cNvPr>
@@ -2421,7 +2422,7 @@
           <p:cNvPr id="7" name="Slide Number Placeholder 6">
             <a:extLst>
               <a:ext uri="{FF2B5EF4-FFF2-40B4-BE49-F238E27FC236}">
-                <a16:creationId xmlns:a16="http://schemas.microsoft.com/office/drawing/2014/main" xmlns="" id="{12B3CBB6-3FFD-45E4-8820-0865B1AA0DF4}"/>
+                <a16:creationId xmlns="" xmlns:a16="http://schemas.microsoft.com/office/drawing/2014/main" id="{12B3CBB6-3FFD-45E4-8820-0865B1AA0DF4}"/>
               </a:ext>
             </a:extLst>
           </p:cNvPr>
@@ -2480,7 +2481,7 @@
           <p:cNvPr id="2" name="Title 1">
             <a:extLst>
               <a:ext uri="{FF2B5EF4-FFF2-40B4-BE49-F238E27FC236}">
-                <a16:creationId xmlns:a16="http://schemas.microsoft.com/office/drawing/2014/main" xmlns="" id="{259B6BAD-D613-4434-A49F-F7D48E3CD76F}"/>
+                <a16:creationId xmlns="" xmlns:a16="http://schemas.microsoft.com/office/drawing/2014/main" id="{259B6BAD-D613-4434-A49F-F7D48E3CD76F}"/>
               </a:ext>
             </a:extLst>
           </p:cNvPr>
@@ -2517,7 +2518,7 @@
           <p:cNvPr id="3" name="Picture Placeholder 2">
             <a:extLst>
               <a:ext uri="{FF2B5EF4-FFF2-40B4-BE49-F238E27FC236}">
-                <a16:creationId xmlns:a16="http://schemas.microsoft.com/office/drawing/2014/main" xmlns="" id="{B53C169B-37D7-4280-81C3-E4D03FABB8D2}"/>
+                <a16:creationId xmlns="" xmlns:a16="http://schemas.microsoft.com/office/drawing/2014/main" id="{B53C169B-37D7-4280-81C3-E4D03FABB8D2}"/>
               </a:ext>
             </a:extLst>
           </p:cNvPr>
@@ -2584,7 +2585,7 @@
           <p:cNvPr id="4" name="Text Placeholder 3">
             <a:extLst>
               <a:ext uri="{FF2B5EF4-FFF2-40B4-BE49-F238E27FC236}">
-                <a16:creationId xmlns:a16="http://schemas.microsoft.com/office/drawing/2014/main" xmlns="" id="{F9C52A1B-4F24-42FA-A688-89A499A07C7B}"/>
+                <a16:creationId xmlns="" xmlns:a16="http://schemas.microsoft.com/office/drawing/2014/main" id="{F9C52A1B-4F24-42FA-A688-89A499A07C7B}"/>
               </a:ext>
             </a:extLst>
           </p:cNvPr>
@@ -2655,7 +2656,7 @@
           <p:cNvPr id="5" name="Date Placeholder 4">
             <a:extLst>
               <a:ext uri="{FF2B5EF4-FFF2-40B4-BE49-F238E27FC236}">
-                <a16:creationId xmlns:a16="http://schemas.microsoft.com/office/drawing/2014/main" xmlns="" id="{894DC1AB-2E05-4DA6-8F03-DFB123868360}"/>
+                <a16:creationId xmlns="" xmlns:a16="http://schemas.microsoft.com/office/drawing/2014/main" id="{894DC1AB-2E05-4DA6-8F03-DFB123868360}"/>
               </a:ext>
             </a:extLst>
           </p:cNvPr>
@@ -2673,7 +2674,7 @@
           <a:p>
             <a:fld id="{99CDF236-79CD-4CF5-9FC4-E5D9CB69F2A4}" type="datetimeFigureOut">
               <a:rPr lang="en-US" smtClean="0"/>
-              <a:t>4/1/2018</a:t>
+              <a:t>4/10/2018</a:t>
             </a:fld>
             <a:endParaRPr lang="en-US"/>
           </a:p>
@@ -2684,7 +2685,7 @@
           <p:cNvPr id="6" name="Footer Placeholder 5">
             <a:extLst>
               <a:ext uri="{FF2B5EF4-FFF2-40B4-BE49-F238E27FC236}">
-                <a16:creationId xmlns:a16="http://schemas.microsoft.com/office/drawing/2014/main" xmlns="" id="{C09D7629-4B44-436A-B912-8B396DC6E800}"/>
+                <a16:creationId xmlns="" xmlns:a16="http://schemas.microsoft.com/office/drawing/2014/main" id="{C09D7629-4B44-436A-B912-8B396DC6E800}"/>
               </a:ext>
             </a:extLst>
           </p:cNvPr>
@@ -2709,7 +2710,7 @@
           <p:cNvPr id="7" name="Slide Number Placeholder 6">
             <a:extLst>
               <a:ext uri="{FF2B5EF4-FFF2-40B4-BE49-F238E27FC236}">
-                <a16:creationId xmlns:a16="http://schemas.microsoft.com/office/drawing/2014/main" xmlns="" id="{979B7450-A835-4827-AC59-30A4375D8606}"/>
+                <a16:creationId xmlns="" xmlns:a16="http://schemas.microsoft.com/office/drawing/2014/main" id="{979B7450-A835-4827-AC59-30A4375D8606}"/>
               </a:ext>
             </a:extLst>
           </p:cNvPr>
@@ -2773,7 +2774,7 @@
           <p:cNvPr id="2" name="Title Placeholder 1">
             <a:extLst>
               <a:ext uri="{FF2B5EF4-FFF2-40B4-BE49-F238E27FC236}">
-                <a16:creationId xmlns:a16="http://schemas.microsoft.com/office/drawing/2014/main" xmlns="" id="{1F402E11-4361-4716-9895-FD3E8E8BC62F}"/>
+                <a16:creationId xmlns="" xmlns:a16="http://schemas.microsoft.com/office/drawing/2014/main" id="{1F402E11-4361-4716-9895-FD3E8E8BC62F}"/>
               </a:ext>
             </a:extLst>
           </p:cNvPr>
@@ -2811,7 +2812,7 @@
           <p:cNvPr id="3" name="Text Placeholder 2">
             <a:extLst>
               <a:ext uri="{FF2B5EF4-FFF2-40B4-BE49-F238E27FC236}">
-                <a16:creationId xmlns:a16="http://schemas.microsoft.com/office/drawing/2014/main" xmlns="" id="{64DEEE84-72A7-4681-9CC5-A931F0C2D2C2}"/>
+                <a16:creationId xmlns="" xmlns:a16="http://schemas.microsoft.com/office/drawing/2014/main" id="{64DEEE84-72A7-4681-9CC5-A931F0C2D2C2}"/>
               </a:ext>
             </a:extLst>
           </p:cNvPr>
@@ -2878,7 +2879,7 @@
           <p:cNvPr id="4" name="Date Placeholder 3">
             <a:extLst>
               <a:ext uri="{FF2B5EF4-FFF2-40B4-BE49-F238E27FC236}">
-                <a16:creationId xmlns:a16="http://schemas.microsoft.com/office/drawing/2014/main" xmlns="" id="{2C27C694-1B10-4CD5-AC21-A64256A8DA1D}"/>
+                <a16:creationId xmlns="" xmlns:a16="http://schemas.microsoft.com/office/drawing/2014/main" id="{2C27C694-1B10-4CD5-AC21-A64256A8DA1D}"/>
               </a:ext>
             </a:extLst>
           </p:cNvPr>
@@ -2914,7 +2915,7 @@
           <a:p>
             <a:fld id="{99CDF236-79CD-4CF5-9FC4-E5D9CB69F2A4}" type="datetimeFigureOut">
               <a:rPr lang="en-US" smtClean="0"/>
-              <a:t>4/1/2018</a:t>
+              <a:t>4/10/2018</a:t>
             </a:fld>
             <a:endParaRPr lang="en-US"/>
           </a:p>
@@ -2925,7 +2926,7 @@
           <p:cNvPr id="5" name="Footer Placeholder 4">
             <a:extLst>
               <a:ext uri="{FF2B5EF4-FFF2-40B4-BE49-F238E27FC236}">
-                <a16:creationId xmlns:a16="http://schemas.microsoft.com/office/drawing/2014/main" xmlns="" id="{67F27DF1-D82F-47EB-81C4-E2505A32BC05}"/>
+                <a16:creationId xmlns="" xmlns:a16="http://schemas.microsoft.com/office/drawing/2014/main" id="{67F27DF1-D82F-47EB-81C4-E2505A32BC05}"/>
               </a:ext>
             </a:extLst>
           </p:cNvPr>
@@ -2968,7 +2969,7 @@
           <p:cNvPr id="6" name="Slide Number Placeholder 5">
             <a:extLst>
               <a:ext uri="{FF2B5EF4-FFF2-40B4-BE49-F238E27FC236}">
-                <a16:creationId xmlns:a16="http://schemas.microsoft.com/office/drawing/2014/main" xmlns="" id="{2A227660-20DA-4F7F-ADBD-26D5BCFBD222}"/>
+                <a16:creationId xmlns="" xmlns:a16="http://schemas.microsoft.com/office/drawing/2014/main" id="{2A227660-20DA-4F7F-ADBD-26D5BCFBD222}"/>
               </a:ext>
             </a:extLst>
           </p:cNvPr>
@@ -3336,7 +3337,7 @@
           <p:cNvPr id="4" name="Source">
             <a:extLst>
               <a:ext uri="{FF2B5EF4-FFF2-40B4-BE49-F238E27FC236}">
-                <a16:creationId xmlns:a16="http://schemas.microsoft.com/office/drawing/2014/main" xmlns="" id="{F3318B5C-75EF-45E7-A3EA-E9D1A5220B2B}"/>
+                <a16:creationId xmlns="" xmlns:a16="http://schemas.microsoft.com/office/drawing/2014/main" id="{F3318B5C-75EF-45E7-A3EA-E9D1A5220B2B}"/>
               </a:ext>
             </a:extLst>
           </p:cNvPr>
@@ -3403,7 +3404,7 @@
           <p:cNvPr id="9" name="Destination">
             <a:extLst>
               <a:ext uri="{FF2B5EF4-FFF2-40B4-BE49-F238E27FC236}">
-                <a16:creationId xmlns:a16="http://schemas.microsoft.com/office/drawing/2014/main" xmlns="" id="{0468B51F-1095-4E12-8565-8ECF4CEC4E5F}"/>
+                <a16:creationId xmlns="" xmlns:a16="http://schemas.microsoft.com/office/drawing/2014/main" id="{0468B51F-1095-4E12-8565-8ECF4CEC4E5F}"/>
               </a:ext>
             </a:extLst>
           </p:cNvPr>
@@ -3485,7 +3486,7 @@
           <p:cNvPr id="4" name="Rectangle 3">
             <a:extLst>
               <a:ext uri="{FF2B5EF4-FFF2-40B4-BE49-F238E27FC236}">
-                <a16:creationId xmlns:a16="http://schemas.microsoft.com/office/drawing/2014/main" xmlns="" id="{F3318B5C-75EF-45E7-A3EA-E9D1A5220B2B}"/>
+                <a16:creationId xmlns="" xmlns:a16="http://schemas.microsoft.com/office/drawing/2014/main" id="{F3318B5C-75EF-45E7-A3EA-E9D1A5220B2B}"/>
               </a:ext>
             </a:extLst>
           </p:cNvPr>
@@ -3552,7 +3553,7 @@
           <p:cNvPr id="9" name="Rectangle 8">
             <a:extLst>
               <a:ext uri="{FF2B5EF4-FFF2-40B4-BE49-F238E27FC236}">
-                <a16:creationId xmlns:a16="http://schemas.microsoft.com/office/drawing/2014/main" xmlns="" id="{0468B51F-1095-4E12-8565-8ECF4CEC4E5F}"/>
+                <a16:creationId xmlns="" xmlns:a16="http://schemas.microsoft.com/office/drawing/2014/main" id="{0468B51F-1095-4E12-8565-8ECF4CEC4E5F}"/>
               </a:ext>
             </a:extLst>
           </p:cNvPr>
@@ -3609,6 +3610,161 @@
     <p:extLst>
       <p:ext uri="{BB962C8B-B14F-4D97-AF65-F5344CB8AC3E}">
         <p14:creationId xmlns:p14="http://schemas.microsoft.com/office/powerpoint/2010/main" val="3026678167"/>
+      </p:ext>
+    </p:extLst>
+  </p:cSld>
+  <p:clrMapOvr>
+    <a:masterClrMapping/>
+  </p:clrMapOvr>
+</p:sld>
+</file>
+
+<file path=ppt/slides/slide3.xml><?xml version="1.0" encoding="utf-8"?>
+<p:sld xmlns:a="http://schemas.openxmlformats.org/drawingml/2006/main" xmlns:r="http://schemas.openxmlformats.org/officeDocument/2006/relationships" xmlns:p="http://schemas.openxmlformats.org/presentationml/2006/main">
+  <p:cSld>
+    <p:spTree>
+      <p:nvGrpSpPr>
+        <p:cNvPr id="1" name=""/>
+        <p:cNvGrpSpPr/>
+        <p:nvPr/>
+      </p:nvGrpSpPr>
+      <p:grpSpPr>
+        <a:xfrm>
+          <a:off x="0" y="0"/>
+          <a:ext cx="0" cy="0"/>
+          <a:chOff x="0" y="0"/>
+          <a:chExt cx="0" cy="0"/>
+        </a:xfrm>
+      </p:grpSpPr>
+      <p:sp>
+        <p:nvSpPr>
+          <p:cNvPr id="4" name="Rectangle 3">
+            <a:extLst>
+              <a:ext uri="{FF2B5EF4-FFF2-40B4-BE49-F238E27FC236}">
+                <a16:creationId xmlns="" xmlns:a16="http://schemas.microsoft.com/office/drawing/2014/main" id="{F3318B5C-75EF-45E7-A3EA-E9D1A5220B2B}"/>
+              </a:ext>
+            </a:extLst>
+          </p:cNvPr>
+          <p:cNvSpPr/>
+          <p:nvPr/>
+        </p:nvSpPr>
+        <p:spPr>
+          <a:xfrm>
+            <a:off x="2138289" y="900332"/>
+            <a:ext cx="3263705" cy="3376246"/>
+          </a:xfrm>
+          <a:prstGeom prst="rect">
+            <a:avLst/>
+          </a:prstGeom>
+          <a:solidFill>
+            <a:schemeClr val="accent1"/>
+          </a:solidFill>
+          <a:ln w="12700" cap="flat" cmpd="sng" algn="ctr">
+            <a:solidFill>
+              <a:srgbClr val="2F528F"/>
+            </a:solidFill>
+            <a:prstDash val="solid"/>
+            <a:miter lim="800000"/>
+            <a:headEnd type="none" w="med" len="med"/>
+            <a:tailEnd type="none" w="med" len="med"/>
+          </a:ln>
+          <a:effectLst>
+            <a:outerShdw blurRad="152400" dist="749300" dir="8520000" sx="90000" sy="-19000" rotWithShape="0">
+              <a:prstClr val="black">
+                <a:alpha val="15000"/>
+              </a:prstClr>
+            </a:outerShdw>
+          </a:effectLst>
+        </p:spPr>
+        <p:style>
+          <a:lnRef idx="2">
+            <a:schemeClr val="accent1">
+              <a:shade val="50000"/>
+            </a:schemeClr>
+          </a:lnRef>
+          <a:fillRef idx="1">
+            <a:schemeClr val="accent1"/>
+          </a:fillRef>
+          <a:effectRef idx="0">
+            <a:schemeClr val="accent1"/>
+          </a:effectRef>
+          <a:fontRef idx="minor">
+            <a:schemeClr val="lt1"/>
+          </a:fontRef>
+        </p:style>
+        <p:txBody>
+          <a:bodyPr rtlCol="0" anchor="ctr"/>
+          <a:lstStyle/>
+          <a:p>
+            <a:pPr algn="ctr"/>
+            <a:endParaRPr lang="en-US">
+              <a:latin typeface="Calibri" panose="020F0502020204030204" pitchFamily="34" charset="0"/>
+            </a:endParaRPr>
+          </a:p>
+        </p:txBody>
+      </p:sp>
+      <p:sp>
+        <p:nvSpPr>
+          <p:cNvPr id="9" name="Rectangle 8">
+            <a:extLst>
+              <a:ext uri="{FF2B5EF4-FFF2-40B4-BE49-F238E27FC236}">
+                <a16:creationId xmlns="" xmlns:a16="http://schemas.microsoft.com/office/drawing/2014/main" id="{0468B51F-1095-4E12-8565-8ECF4CEC4E5F}"/>
+              </a:ext>
+            </a:extLst>
+          </p:cNvPr>
+          <p:cNvSpPr/>
+          <p:nvPr/>
+        </p:nvSpPr>
+        <p:spPr>
+          <a:xfrm>
+            <a:off x="7961991" y="1686545"/>
+            <a:ext cx="2135734" cy="1803820"/>
+          </a:xfrm>
+          <a:prstGeom prst="rect">
+            <a:avLst/>
+          </a:prstGeom>
+          <a:effectLst>
+            <a:outerShdw blurRad="152400" dist="317500" dir="5400000" sx="90000" sy="-19000" rotWithShape="0">
+              <a:srgbClr val="000000">
+                <a:alpha val="15000"/>
+              </a:srgbClr>
+            </a:outerShdw>
+          </a:effectLst>
+          <a:extLst>
+            <a:ext uri="{53640926-AAD7-44D8-BBD7-CCE9431645EC}">
+              <a14:shadowObscured xmlns:a14="http://schemas.microsoft.com/office/drawing/2010/main"/>
+            </a:ext>
+          </a:extLst>
+        </p:spPr>
+        <p:style>
+          <a:lnRef idx="2">
+            <a:schemeClr val="accent1">
+              <a:shade val="50000"/>
+            </a:schemeClr>
+          </a:lnRef>
+          <a:fillRef idx="1">
+            <a:schemeClr val="accent1"/>
+          </a:fillRef>
+          <a:effectRef idx="0">
+            <a:schemeClr val="accent1"/>
+          </a:effectRef>
+          <a:fontRef idx="minor">
+            <a:schemeClr val="lt1"/>
+          </a:fontRef>
+        </p:style>
+        <p:txBody>
+          <a:bodyPr rtlCol="0" anchor="ctr"/>
+          <a:lstStyle/>
+          <a:p>
+            <a:pPr algn="ctr"/>
+            <a:endParaRPr lang="en-US"/>
+          </a:p>
+        </p:txBody>
+      </p:sp>
+    </p:spTree>
+    <p:extLst>
+      <p:ext uri="{BB962C8B-B14F-4D97-AF65-F5344CB8AC3E}">
+        <p14:creationId xmlns:p14="http://schemas.microsoft.com/office/powerpoint/2010/main" val="835458941"/>
       </p:ext>
     </p:extLst>
   </p:cSld>

</xml_diff>